<commit_message>
Add TodoApplication and filter-project with initial setup, including servlets, JSP pages, and Maven configuration
</commit_message>
<xml_diff>
--- a/Servlet.pptx
+++ b/Servlet.pptx
@@ -16,6 +16,8 @@
     <p:sldId id="264" r:id="rId10"/>
     <p:sldId id="265" r:id="rId11"/>
     <p:sldId id="266" r:id="rId12"/>
+    <p:sldId id="267" r:id="rId13"/>
+    <p:sldId id="268" r:id="rId14"/>
   </p:sldIdLst>
   <p:sldSz cx="12192000" cy="6858000"/>
   <p:notesSz cx="6858000" cy="9144000"/>
@@ -253,7 +255,7 @@
           <a:p>
             <a:fld id="{08F07EE7-8551-46C8-8A9C-D13C266C12F4}" type="datetimeFigureOut">
               <a:rPr lang="en-IN" smtClean="0"/>
-              <a:t>03-05-2025</a:t>
+              <a:t>05-05-2025</a:t>
             </a:fld>
             <a:endParaRPr lang="en-IN"/>
           </a:p>
@@ -423,7 +425,7 @@
           <a:p>
             <a:fld id="{08F07EE7-8551-46C8-8A9C-D13C266C12F4}" type="datetimeFigureOut">
               <a:rPr lang="en-IN" smtClean="0"/>
-              <a:t>03-05-2025</a:t>
+              <a:t>05-05-2025</a:t>
             </a:fld>
             <a:endParaRPr lang="en-IN"/>
           </a:p>
@@ -603,7 +605,7 @@
           <a:p>
             <a:fld id="{08F07EE7-8551-46C8-8A9C-D13C266C12F4}" type="datetimeFigureOut">
               <a:rPr lang="en-IN" smtClean="0"/>
-              <a:t>03-05-2025</a:t>
+              <a:t>05-05-2025</a:t>
             </a:fld>
             <a:endParaRPr lang="en-IN"/>
           </a:p>
@@ -773,7 +775,7 @@
           <a:p>
             <a:fld id="{08F07EE7-8551-46C8-8A9C-D13C266C12F4}" type="datetimeFigureOut">
               <a:rPr lang="en-IN" smtClean="0"/>
-              <a:t>03-05-2025</a:t>
+              <a:t>05-05-2025</a:t>
             </a:fld>
             <a:endParaRPr lang="en-IN"/>
           </a:p>
@@ -1019,7 +1021,7 @@
           <a:p>
             <a:fld id="{08F07EE7-8551-46C8-8A9C-D13C266C12F4}" type="datetimeFigureOut">
               <a:rPr lang="en-IN" smtClean="0"/>
-              <a:t>03-05-2025</a:t>
+              <a:t>05-05-2025</a:t>
             </a:fld>
             <a:endParaRPr lang="en-IN"/>
           </a:p>
@@ -1251,7 +1253,7 @@
           <a:p>
             <a:fld id="{08F07EE7-8551-46C8-8A9C-D13C266C12F4}" type="datetimeFigureOut">
               <a:rPr lang="en-IN" smtClean="0"/>
-              <a:t>03-05-2025</a:t>
+              <a:t>05-05-2025</a:t>
             </a:fld>
             <a:endParaRPr lang="en-IN"/>
           </a:p>
@@ -1618,7 +1620,7 @@
           <a:p>
             <a:fld id="{08F07EE7-8551-46C8-8A9C-D13C266C12F4}" type="datetimeFigureOut">
               <a:rPr lang="en-IN" smtClean="0"/>
-              <a:t>03-05-2025</a:t>
+              <a:t>05-05-2025</a:t>
             </a:fld>
             <a:endParaRPr lang="en-IN"/>
           </a:p>
@@ -1736,7 +1738,7 @@
           <a:p>
             <a:fld id="{08F07EE7-8551-46C8-8A9C-D13C266C12F4}" type="datetimeFigureOut">
               <a:rPr lang="en-IN" smtClean="0"/>
-              <a:t>03-05-2025</a:t>
+              <a:t>05-05-2025</a:t>
             </a:fld>
             <a:endParaRPr lang="en-IN"/>
           </a:p>
@@ -1831,7 +1833,7 @@
           <a:p>
             <a:fld id="{08F07EE7-8551-46C8-8A9C-D13C266C12F4}" type="datetimeFigureOut">
               <a:rPr lang="en-IN" smtClean="0"/>
-              <a:t>03-05-2025</a:t>
+              <a:t>05-05-2025</a:t>
             </a:fld>
             <a:endParaRPr lang="en-IN"/>
           </a:p>
@@ -2108,7 +2110,7 @@
           <a:p>
             <a:fld id="{08F07EE7-8551-46C8-8A9C-D13C266C12F4}" type="datetimeFigureOut">
               <a:rPr lang="en-IN" smtClean="0"/>
-              <a:t>03-05-2025</a:t>
+              <a:t>05-05-2025</a:t>
             </a:fld>
             <a:endParaRPr lang="en-IN"/>
           </a:p>
@@ -2361,7 +2363,7 @@
           <a:p>
             <a:fld id="{08F07EE7-8551-46C8-8A9C-D13C266C12F4}" type="datetimeFigureOut">
               <a:rPr lang="en-IN" smtClean="0"/>
-              <a:t>03-05-2025</a:t>
+              <a:t>05-05-2025</a:t>
             </a:fld>
             <a:endParaRPr lang="en-IN"/>
           </a:p>
@@ -2574,7 +2576,7 @@
           <a:p>
             <a:fld id="{08F07EE7-8551-46C8-8A9C-D13C266C12F4}" type="datetimeFigureOut">
               <a:rPr lang="en-IN" smtClean="0"/>
-              <a:t>03-05-2025</a:t>
+              <a:t>05-05-2025</a:t>
             </a:fld>
             <a:endParaRPr lang="en-IN"/>
           </a:p>
@@ -4196,6 +4198,1566 @@
 </p:sld>
 </file>
 
+<file path=ppt/slides/slide12.xml><?xml version="1.0" encoding="utf-8"?>
+<p:sld xmlns:a="http://schemas.openxmlformats.org/drawingml/2006/main" xmlns:r="http://schemas.openxmlformats.org/officeDocument/2006/relationships" xmlns:p="http://schemas.openxmlformats.org/presentationml/2006/main">
+  <p:cSld>
+    <p:spTree>
+      <p:nvGrpSpPr>
+        <p:cNvPr id="1" name=""/>
+        <p:cNvGrpSpPr/>
+        <p:nvPr/>
+      </p:nvGrpSpPr>
+      <p:grpSpPr>
+        <a:xfrm>
+          <a:off x="0" y="0"/>
+          <a:ext cx="0" cy="0"/>
+          <a:chOff x="0" y="0"/>
+          <a:chExt cx="0" cy="0"/>
+        </a:xfrm>
+      </p:grpSpPr>
+      <p:sp>
+        <p:nvSpPr>
+          <p:cNvPr id="2" name="TextBox 1"/>
+          <p:cNvSpPr txBox="1"/>
+          <p:nvPr/>
+        </p:nvSpPr>
+        <p:spPr>
+          <a:xfrm>
+            <a:off x="1179871" y="1602658"/>
+            <a:ext cx="617477" cy="369332"/>
+          </a:xfrm>
+          <a:prstGeom prst="rect">
+            <a:avLst/>
+          </a:prstGeom>
+          <a:noFill/>
+        </p:spPr>
+        <p:txBody>
+          <a:bodyPr wrap="none" rtlCol="0">
+            <a:spAutoFit/>
+          </a:bodyPr>
+          <a:lstStyle/>
+          <a:p>
+            <a:r>
+              <a:rPr lang="en-US" dirty="0" smtClean="0"/>
+              <a:t>User</a:t>
+            </a:r>
+            <a:endParaRPr lang="en-IN" dirty="0"/>
+          </a:p>
+        </p:txBody>
+      </p:sp>
+      <p:cxnSp>
+        <p:nvCxnSpPr>
+          <p:cNvPr id="4" name="Straight Arrow Connector 3"/>
+          <p:cNvCxnSpPr>
+            <a:stCxn id="2" idx="3"/>
+          </p:cNvCxnSpPr>
+          <p:nvPr/>
+        </p:nvCxnSpPr>
+        <p:spPr>
+          <a:xfrm>
+            <a:off x="1797348" y="1787324"/>
+            <a:ext cx="1712768" cy="41476"/>
+          </a:xfrm>
+          <a:prstGeom prst="straightConnector1">
+            <a:avLst/>
+          </a:prstGeom>
+          <a:ln>
+            <a:tailEnd type="triangle"/>
+          </a:ln>
+        </p:spPr>
+        <p:style>
+          <a:lnRef idx="1">
+            <a:schemeClr val="accent1"/>
+          </a:lnRef>
+          <a:fillRef idx="0">
+            <a:schemeClr val="accent1"/>
+          </a:fillRef>
+          <a:effectRef idx="0">
+            <a:schemeClr val="accent1"/>
+          </a:effectRef>
+          <a:fontRef idx="minor">
+            <a:schemeClr val="tx1"/>
+          </a:fontRef>
+        </p:style>
+      </p:cxnSp>
+      <p:sp>
+        <p:nvSpPr>
+          <p:cNvPr id="5" name="Rectangle 4"/>
+          <p:cNvSpPr/>
+          <p:nvPr/>
+        </p:nvSpPr>
+        <p:spPr>
+          <a:xfrm>
+            <a:off x="3510117" y="1106129"/>
+            <a:ext cx="1445342" cy="1445342"/>
+          </a:xfrm>
+          <a:prstGeom prst="rect">
+            <a:avLst/>
+          </a:prstGeom>
+        </p:spPr>
+        <p:style>
+          <a:lnRef idx="2">
+            <a:schemeClr val="accent1">
+              <a:shade val="50000"/>
+            </a:schemeClr>
+          </a:lnRef>
+          <a:fillRef idx="1">
+            <a:schemeClr val="accent1"/>
+          </a:fillRef>
+          <a:effectRef idx="0">
+            <a:schemeClr val="accent1"/>
+          </a:effectRef>
+          <a:fontRef idx="minor">
+            <a:schemeClr val="lt1"/>
+          </a:fontRef>
+        </p:style>
+        <p:txBody>
+          <a:bodyPr rtlCol="0" anchor="ctr"/>
+          <a:lstStyle/>
+          <a:p>
+            <a:pPr algn="ctr"/>
+            <a:r>
+              <a:rPr lang="en-US" dirty="0" smtClean="0"/>
+              <a:t>Filter</a:t>
+            </a:r>
+            <a:endParaRPr lang="en-IN" dirty="0"/>
+          </a:p>
+        </p:txBody>
+      </p:sp>
+      <p:sp>
+        <p:nvSpPr>
+          <p:cNvPr id="6" name="Rectangle 5"/>
+          <p:cNvSpPr/>
+          <p:nvPr/>
+        </p:nvSpPr>
+        <p:spPr>
+          <a:xfrm>
+            <a:off x="8691717" y="1106129"/>
+            <a:ext cx="2074606" cy="1445342"/>
+          </a:xfrm>
+          <a:prstGeom prst="rect">
+            <a:avLst/>
+          </a:prstGeom>
+        </p:spPr>
+        <p:style>
+          <a:lnRef idx="2">
+            <a:schemeClr val="accent1">
+              <a:shade val="50000"/>
+            </a:schemeClr>
+          </a:lnRef>
+          <a:fillRef idx="1">
+            <a:schemeClr val="accent1"/>
+          </a:fillRef>
+          <a:effectRef idx="0">
+            <a:schemeClr val="accent1"/>
+          </a:effectRef>
+          <a:fontRef idx="minor">
+            <a:schemeClr val="lt1"/>
+          </a:fontRef>
+        </p:style>
+        <p:txBody>
+          <a:bodyPr rtlCol="0" anchor="ctr"/>
+          <a:lstStyle/>
+          <a:p>
+            <a:pPr algn="ctr"/>
+            <a:r>
+              <a:rPr lang="en-US" dirty="0" smtClean="0"/>
+              <a:t>Servlet</a:t>
+            </a:r>
+            <a:endParaRPr lang="en-IN" dirty="0"/>
+          </a:p>
+        </p:txBody>
+      </p:sp>
+      <p:sp>
+        <p:nvSpPr>
+          <p:cNvPr id="7" name="Rectangle 6"/>
+          <p:cNvSpPr/>
+          <p:nvPr/>
+        </p:nvSpPr>
+        <p:spPr>
+          <a:xfrm>
+            <a:off x="5638801" y="1106129"/>
+            <a:ext cx="1445342" cy="1445342"/>
+          </a:xfrm>
+          <a:prstGeom prst="rect">
+            <a:avLst/>
+          </a:prstGeom>
+        </p:spPr>
+        <p:style>
+          <a:lnRef idx="2">
+            <a:schemeClr val="accent1">
+              <a:shade val="50000"/>
+            </a:schemeClr>
+          </a:lnRef>
+          <a:fillRef idx="1">
+            <a:schemeClr val="accent1"/>
+          </a:fillRef>
+          <a:effectRef idx="0">
+            <a:schemeClr val="accent1"/>
+          </a:effectRef>
+          <a:fontRef idx="minor">
+            <a:schemeClr val="lt1"/>
+          </a:fontRef>
+        </p:style>
+        <p:txBody>
+          <a:bodyPr rtlCol="0" anchor="ctr"/>
+          <a:lstStyle/>
+          <a:p>
+            <a:pPr algn="ctr"/>
+            <a:r>
+              <a:rPr lang="en-US" dirty="0" smtClean="0"/>
+              <a:t>Filter</a:t>
+            </a:r>
+            <a:endParaRPr lang="en-IN" dirty="0"/>
+          </a:p>
+        </p:txBody>
+      </p:sp>
+      <p:cxnSp>
+        <p:nvCxnSpPr>
+          <p:cNvPr id="9" name="Straight Arrow Connector 8"/>
+          <p:cNvCxnSpPr>
+            <a:stCxn id="5" idx="3"/>
+            <a:endCxn id="7" idx="1"/>
+          </p:cNvCxnSpPr>
+          <p:nvPr/>
+        </p:nvCxnSpPr>
+        <p:spPr>
+          <a:xfrm>
+            <a:off x="4955459" y="1828800"/>
+            <a:ext cx="683342" cy="0"/>
+          </a:xfrm>
+          <a:prstGeom prst="straightConnector1">
+            <a:avLst/>
+          </a:prstGeom>
+          <a:ln>
+            <a:tailEnd type="triangle"/>
+          </a:ln>
+        </p:spPr>
+        <p:style>
+          <a:lnRef idx="1">
+            <a:schemeClr val="accent1"/>
+          </a:lnRef>
+          <a:fillRef idx="0">
+            <a:schemeClr val="accent1"/>
+          </a:fillRef>
+          <a:effectRef idx="0">
+            <a:schemeClr val="accent1"/>
+          </a:effectRef>
+          <a:fontRef idx="minor">
+            <a:schemeClr val="tx1"/>
+          </a:fontRef>
+        </p:style>
+      </p:cxnSp>
+      <p:cxnSp>
+        <p:nvCxnSpPr>
+          <p:cNvPr id="11" name="Straight Arrow Connector 10"/>
+          <p:cNvCxnSpPr>
+            <a:stCxn id="7" idx="3"/>
+          </p:cNvCxnSpPr>
+          <p:nvPr/>
+        </p:nvCxnSpPr>
+        <p:spPr>
+          <a:xfrm>
+            <a:off x="7084143" y="1828800"/>
+            <a:ext cx="1499418" cy="0"/>
+          </a:xfrm>
+          <a:prstGeom prst="straightConnector1">
+            <a:avLst/>
+          </a:prstGeom>
+          <a:ln>
+            <a:tailEnd type="triangle"/>
+          </a:ln>
+        </p:spPr>
+        <p:style>
+          <a:lnRef idx="1">
+            <a:schemeClr val="accent1"/>
+          </a:lnRef>
+          <a:fillRef idx="0">
+            <a:schemeClr val="accent1"/>
+          </a:fillRef>
+          <a:effectRef idx="0">
+            <a:schemeClr val="accent1"/>
+          </a:effectRef>
+          <a:fontRef idx="minor">
+            <a:schemeClr val="tx1"/>
+          </a:fontRef>
+        </p:style>
+      </p:cxnSp>
+      <p:sp>
+        <p:nvSpPr>
+          <p:cNvPr id="13" name="TextBox 12"/>
+          <p:cNvSpPr txBox="1"/>
+          <p:nvPr/>
+        </p:nvSpPr>
+        <p:spPr>
+          <a:xfrm>
+            <a:off x="3679875" y="736797"/>
+            <a:ext cx="1269899" cy="369332"/>
+          </a:xfrm>
+          <a:prstGeom prst="rect">
+            <a:avLst/>
+          </a:prstGeom>
+          <a:noFill/>
+        </p:spPr>
+        <p:txBody>
+          <a:bodyPr wrap="none" rtlCol="0">
+            <a:spAutoFit/>
+          </a:bodyPr>
+          <a:lstStyle/>
+          <a:p>
+            <a:r>
+              <a:rPr lang="en-US" dirty="0" smtClean="0"/>
+              <a:t>Condition 1</a:t>
+            </a:r>
+            <a:endParaRPr lang="en-IN" dirty="0"/>
+          </a:p>
+        </p:txBody>
+      </p:sp>
+      <p:sp>
+        <p:nvSpPr>
+          <p:cNvPr id="14" name="TextBox 13"/>
+          <p:cNvSpPr txBox="1"/>
+          <p:nvPr/>
+        </p:nvSpPr>
+        <p:spPr>
+          <a:xfrm>
+            <a:off x="5726522" y="746007"/>
+            <a:ext cx="1269899" cy="369332"/>
+          </a:xfrm>
+          <a:prstGeom prst="rect">
+            <a:avLst/>
+          </a:prstGeom>
+          <a:noFill/>
+        </p:spPr>
+        <p:txBody>
+          <a:bodyPr wrap="none" rtlCol="0">
+            <a:spAutoFit/>
+          </a:bodyPr>
+          <a:lstStyle/>
+          <a:p>
+            <a:r>
+              <a:rPr lang="en-US" dirty="0" smtClean="0"/>
+              <a:t>Condition 2</a:t>
+            </a:r>
+            <a:endParaRPr lang="en-IN" dirty="0"/>
+          </a:p>
+        </p:txBody>
+      </p:sp>
+      <p:cxnSp>
+        <p:nvCxnSpPr>
+          <p:cNvPr id="16" name="Straight Arrow Connector 15"/>
+          <p:cNvCxnSpPr/>
+          <p:nvPr/>
+        </p:nvCxnSpPr>
+        <p:spPr>
+          <a:xfrm flipH="1" flipV="1">
+            <a:off x="5053781" y="2143432"/>
+            <a:ext cx="501445" cy="19665"/>
+          </a:xfrm>
+          <a:prstGeom prst="straightConnector1">
+            <a:avLst/>
+          </a:prstGeom>
+          <a:ln>
+            <a:tailEnd type="triangle"/>
+          </a:ln>
+        </p:spPr>
+        <p:style>
+          <a:lnRef idx="1">
+            <a:schemeClr val="accent1"/>
+          </a:lnRef>
+          <a:fillRef idx="0">
+            <a:schemeClr val="accent1"/>
+          </a:fillRef>
+          <a:effectRef idx="0">
+            <a:schemeClr val="accent1"/>
+          </a:effectRef>
+          <a:fontRef idx="minor">
+            <a:schemeClr val="tx1"/>
+          </a:fontRef>
+        </p:style>
+      </p:cxnSp>
+      <p:cxnSp>
+        <p:nvCxnSpPr>
+          <p:cNvPr id="18" name="Straight Arrow Connector 17"/>
+          <p:cNvCxnSpPr/>
+          <p:nvPr/>
+        </p:nvCxnSpPr>
+        <p:spPr>
+          <a:xfrm flipH="1" flipV="1">
+            <a:off x="1902543" y="1971990"/>
+            <a:ext cx="1519083" cy="208313"/>
+          </a:xfrm>
+          <a:prstGeom prst="straightConnector1">
+            <a:avLst/>
+          </a:prstGeom>
+          <a:ln>
+            <a:tailEnd type="triangle"/>
+          </a:ln>
+        </p:spPr>
+        <p:style>
+          <a:lnRef idx="1">
+            <a:schemeClr val="accent1"/>
+          </a:lnRef>
+          <a:fillRef idx="0">
+            <a:schemeClr val="accent1"/>
+          </a:fillRef>
+          <a:effectRef idx="0">
+            <a:schemeClr val="accent1"/>
+          </a:effectRef>
+          <a:fontRef idx="minor">
+            <a:schemeClr val="tx1"/>
+          </a:fontRef>
+        </p:style>
+      </p:cxnSp>
+      <p:sp>
+        <p:nvSpPr>
+          <p:cNvPr id="19" name="TextBox 18"/>
+          <p:cNvSpPr txBox="1"/>
+          <p:nvPr/>
+        </p:nvSpPr>
+        <p:spPr>
+          <a:xfrm>
+            <a:off x="1656817" y="2871019"/>
+            <a:ext cx="9506641" cy="369332"/>
+          </a:xfrm>
+          <a:prstGeom prst="rect">
+            <a:avLst/>
+          </a:prstGeom>
+          <a:noFill/>
+        </p:spPr>
+        <p:txBody>
+          <a:bodyPr wrap="none" rtlCol="0">
+            <a:spAutoFit/>
+          </a:bodyPr>
+          <a:lstStyle/>
+          <a:p>
+            <a:r>
+              <a:rPr lang="en-US" dirty="0" smtClean="0"/>
+              <a:t>If request fulfills the </a:t>
+            </a:r>
+            <a:r>
+              <a:rPr lang="en-US" b="1" dirty="0" smtClean="0"/>
+              <a:t>condition 1 &amp; 2</a:t>
+            </a:r>
+            <a:r>
+              <a:rPr lang="en-US" dirty="0" smtClean="0"/>
+              <a:t> properly then only the request will be forwarded to the servlet</a:t>
+            </a:r>
+            <a:endParaRPr lang="en-IN" dirty="0"/>
+          </a:p>
+        </p:txBody>
+      </p:sp>
+      <p:sp>
+        <p:nvSpPr>
+          <p:cNvPr id="21" name="TextBox 20"/>
+          <p:cNvSpPr txBox="1"/>
+          <p:nvPr/>
+        </p:nvSpPr>
+        <p:spPr>
+          <a:xfrm>
+            <a:off x="2735318" y="3217916"/>
+            <a:ext cx="7252306" cy="369332"/>
+          </a:xfrm>
+          <a:prstGeom prst="rect">
+            <a:avLst/>
+          </a:prstGeom>
+          <a:noFill/>
+        </p:spPr>
+        <p:txBody>
+          <a:bodyPr wrap="none" rtlCol="0">
+            <a:spAutoFit/>
+          </a:bodyPr>
+          <a:lstStyle/>
+          <a:p>
+            <a:r>
+              <a:rPr lang="en-US" dirty="0" smtClean="0"/>
+              <a:t>Otherwise the user will receive proper </a:t>
+            </a:r>
+            <a:r>
+              <a:rPr lang="en-US" dirty="0" smtClean="0">
+                <a:solidFill>
+                  <a:srgbClr val="FF0000"/>
+                </a:solidFill>
+              </a:rPr>
+              <a:t>error response </a:t>
+            </a:r>
+            <a:r>
+              <a:rPr lang="en-US" dirty="0" smtClean="0"/>
+              <a:t>or a </a:t>
+            </a:r>
+            <a:r>
+              <a:rPr lang="en-US" dirty="0" smtClean="0">
+                <a:solidFill>
+                  <a:srgbClr val="FF0000"/>
+                </a:solidFill>
+              </a:rPr>
+              <a:t>default response</a:t>
+            </a:r>
+            <a:endParaRPr lang="en-IN" dirty="0">
+              <a:solidFill>
+                <a:srgbClr val="FF0000"/>
+              </a:solidFill>
+            </a:endParaRPr>
+          </a:p>
+        </p:txBody>
+      </p:sp>
+      <p:sp>
+        <p:nvSpPr>
+          <p:cNvPr id="31" name="TextBox 30"/>
+          <p:cNvSpPr txBox="1"/>
+          <p:nvPr/>
+        </p:nvSpPr>
+        <p:spPr>
+          <a:xfrm>
+            <a:off x="3342968" y="4552335"/>
+            <a:ext cx="2912977" cy="646331"/>
+          </a:xfrm>
+          <a:prstGeom prst="rect">
+            <a:avLst/>
+          </a:prstGeom>
+          <a:noFill/>
+        </p:spPr>
+        <p:txBody>
+          <a:bodyPr wrap="none" rtlCol="0">
+            <a:spAutoFit/>
+          </a:bodyPr>
+          <a:lstStyle/>
+          <a:p>
+            <a:r>
+              <a:rPr lang="en-US" dirty="0" smtClean="0"/>
+              <a:t>Condition 1 : is less than 30 ?</a:t>
+            </a:r>
+          </a:p>
+          <a:p>
+            <a:r>
+              <a:rPr lang="en-US" dirty="0" smtClean="0"/>
+              <a:t>Condition 2 : is even ?</a:t>
+            </a:r>
+            <a:endParaRPr lang="en-IN" dirty="0"/>
+          </a:p>
+        </p:txBody>
+      </p:sp>
+    </p:spTree>
+    <p:extLst>
+      <p:ext uri="{BB962C8B-B14F-4D97-AF65-F5344CB8AC3E}">
+        <p14:creationId xmlns:p14="http://schemas.microsoft.com/office/powerpoint/2010/main" val="2993837796"/>
+      </p:ext>
+    </p:extLst>
+  </p:cSld>
+  <p:clrMapOvr>
+    <a:masterClrMapping/>
+  </p:clrMapOvr>
+</p:sld>
+</file>
+
+<file path=ppt/slides/slide13.xml><?xml version="1.0" encoding="utf-8"?>
+<p:sld xmlns:a="http://schemas.openxmlformats.org/drawingml/2006/main" xmlns:r="http://schemas.openxmlformats.org/officeDocument/2006/relationships" xmlns:p="http://schemas.openxmlformats.org/presentationml/2006/main">
+  <p:cSld>
+    <p:spTree>
+      <p:nvGrpSpPr>
+        <p:cNvPr id="1" name=""/>
+        <p:cNvGrpSpPr/>
+        <p:nvPr/>
+      </p:nvGrpSpPr>
+      <p:grpSpPr>
+        <a:xfrm>
+          <a:off x="0" y="0"/>
+          <a:ext cx="0" cy="0"/>
+          <a:chOff x="0" y="0"/>
+          <a:chExt cx="0" cy="0"/>
+        </a:xfrm>
+      </p:grpSpPr>
+      <p:sp>
+        <p:nvSpPr>
+          <p:cNvPr id="2" name="TextBox 1"/>
+          <p:cNvSpPr txBox="1"/>
+          <p:nvPr/>
+        </p:nvSpPr>
+        <p:spPr>
+          <a:xfrm>
+            <a:off x="4670322" y="186813"/>
+            <a:ext cx="2724207" cy="523220"/>
+          </a:xfrm>
+          <a:prstGeom prst="rect">
+            <a:avLst/>
+          </a:prstGeom>
+          <a:noFill/>
+        </p:spPr>
+        <p:txBody>
+          <a:bodyPr wrap="none" rtlCol="0">
+            <a:spAutoFit/>
+          </a:bodyPr>
+          <a:lstStyle/>
+          <a:p>
+            <a:r>
+              <a:rPr lang="en-US" sz="2800" b="1" dirty="0" err="1" smtClean="0"/>
+              <a:t>ToDo</a:t>
+            </a:r>
+            <a:r>
+              <a:rPr lang="en-US" sz="2800" b="1" dirty="0" smtClean="0"/>
+              <a:t> Application</a:t>
+            </a:r>
+            <a:endParaRPr lang="en-IN" sz="2800" b="1" dirty="0"/>
+          </a:p>
+        </p:txBody>
+      </p:sp>
+      <p:sp>
+        <p:nvSpPr>
+          <p:cNvPr id="3" name="TextBox 2"/>
+          <p:cNvSpPr txBox="1"/>
+          <p:nvPr/>
+        </p:nvSpPr>
+        <p:spPr>
+          <a:xfrm>
+            <a:off x="4638069" y="639097"/>
+            <a:ext cx="2756460" cy="369332"/>
+          </a:xfrm>
+          <a:prstGeom prst="rect">
+            <a:avLst/>
+          </a:prstGeom>
+          <a:noFill/>
+        </p:spPr>
+        <p:txBody>
+          <a:bodyPr wrap="none" rtlCol="0">
+            <a:spAutoFit/>
+          </a:bodyPr>
+          <a:lstStyle/>
+          <a:p>
+            <a:r>
+              <a:rPr lang="en-US" dirty="0" smtClean="0"/>
+              <a:t>(Track Day to Day activities)</a:t>
+            </a:r>
+            <a:endParaRPr lang="en-IN" dirty="0"/>
+          </a:p>
+        </p:txBody>
+      </p:sp>
+      <p:sp>
+        <p:nvSpPr>
+          <p:cNvPr id="4" name="Rectangle 3"/>
+          <p:cNvSpPr/>
+          <p:nvPr/>
+        </p:nvSpPr>
+        <p:spPr>
+          <a:xfrm>
+            <a:off x="3269561" y="1641988"/>
+            <a:ext cx="3873910" cy="4247535"/>
+          </a:xfrm>
+          <a:prstGeom prst="rect">
+            <a:avLst/>
+          </a:prstGeom>
+        </p:spPr>
+        <p:style>
+          <a:lnRef idx="2">
+            <a:schemeClr val="accent1">
+              <a:shade val="50000"/>
+            </a:schemeClr>
+          </a:lnRef>
+          <a:fillRef idx="1">
+            <a:schemeClr val="accent1"/>
+          </a:fillRef>
+          <a:effectRef idx="0">
+            <a:schemeClr val="accent1"/>
+          </a:effectRef>
+          <a:fontRef idx="minor">
+            <a:schemeClr val="lt1"/>
+          </a:fontRef>
+        </p:style>
+        <p:txBody>
+          <a:bodyPr rtlCol="0" anchor="ctr"/>
+          <a:lstStyle/>
+          <a:p>
+            <a:pPr algn="ctr"/>
+            <a:endParaRPr lang="en-IN" dirty="0"/>
+          </a:p>
+        </p:txBody>
+      </p:sp>
+      <p:sp>
+        <p:nvSpPr>
+          <p:cNvPr id="5" name="Rectangle 4"/>
+          <p:cNvSpPr/>
+          <p:nvPr/>
+        </p:nvSpPr>
+        <p:spPr>
+          <a:xfrm>
+            <a:off x="8308258" y="1582994"/>
+            <a:ext cx="3706761" cy="4306529"/>
+          </a:xfrm>
+          <a:prstGeom prst="rect">
+            <a:avLst/>
+          </a:prstGeom>
+        </p:spPr>
+        <p:style>
+          <a:lnRef idx="2">
+            <a:schemeClr val="accent1">
+              <a:shade val="50000"/>
+            </a:schemeClr>
+          </a:lnRef>
+          <a:fillRef idx="1">
+            <a:schemeClr val="accent1"/>
+          </a:fillRef>
+          <a:effectRef idx="0">
+            <a:schemeClr val="accent1"/>
+          </a:effectRef>
+          <a:fontRef idx="minor">
+            <a:schemeClr val="lt1"/>
+          </a:fontRef>
+        </p:style>
+        <p:txBody>
+          <a:bodyPr rtlCol="0" anchor="ctr"/>
+          <a:lstStyle/>
+          <a:p>
+            <a:pPr algn="ctr"/>
+            <a:endParaRPr lang="en-IN" dirty="0"/>
+          </a:p>
+        </p:txBody>
+      </p:sp>
+      <p:sp>
+        <p:nvSpPr>
+          <p:cNvPr id="6" name="TextBox 5"/>
+          <p:cNvSpPr txBox="1"/>
+          <p:nvPr/>
+        </p:nvSpPr>
+        <p:spPr>
+          <a:xfrm>
+            <a:off x="4523797" y="1720646"/>
+            <a:ext cx="1365438" cy="369332"/>
+          </a:xfrm>
+          <a:prstGeom prst="rect">
+            <a:avLst/>
+          </a:prstGeom>
+          <a:noFill/>
+        </p:spPr>
+        <p:txBody>
+          <a:bodyPr wrap="none" rtlCol="0">
+            <a:spAutoFit/>
+          </a:bodyPr>
+          <a:lstStyle/>
+          <a:p>
+            <a:r>
+              <a:rPr lang="en-US" dirty="0" smtClean="0"/>
+              <a:t>List of </a:t>
+            </a:r>
+            <a:r>
+              <a:rPr lang="en-US" dirty="0" err="1" smtClean="0"/>
+              <a:t>ToDos</a:t>
+            </a:r>
+            <a:endParaRPr lang="en-IN" dirty="0"/>
+          </a:p>
+        </p:txBody>
+      </p:sp>
+      <p:sp>
+        <p:nvSpPr>
+          <p:cNvPr id="7" name="Rectangle 6"/>
+          <p:cNvSpPr/>
+          <p:nvPr/>
+        </p:nvSpPr>
+        <p:spPr>
+          <a:xfrm>
+            <a:off x="3539613" y="2300749"/>
+            <a:ext cx="3323303" cy="501445"/>
+          </a:xfrm>
+          <a:prstGeom prst="rect">
+            <a:avLst/>
+          </a:prstGeom>
+          <a:solidFill>
+            <a:schemeClr val="accent2"/>
+          </a:solidFill>
+        </p:spPr>
+        <p:style>
+          <a:lnRef idx="2">
+            <a:schemeClr val="accent1">
+              <a:shade val="50000"/>
+            </a:schemeClr>
+          </a:lnRef>
+          <a:fillRef idx="1">
+            <a:schemeClr val="accent1"/>
+          </a:fillRef>
+          <a:effectRef idx="0">
+            <a:schemeClr val="accent1"/>
+          </a:effectRef>
+          <a:fontRef idx="minor">
+            <a:schemeClr val="lt1"/>
+          </a:fontRef>
+        </p:style>
+        <p:txBody>
+          <a:bodyPr rtlCol="0" anchor="ctr"/>
+          <a:lstStyle/>
+          <a:p>
+            <a:pPr algn="ctr"/>
+            <a:r>
+              <a:rPr lang="en-US" dirty="0" err="1" smtClean="0"/>
+              <a:t>Todo</a:t>
+            </a:r>
+            <a:r>
+              <a:rPr lang="en-US" dirty="0" smtClean="0"/>
+              <a:t> 1</a:t>
+            </a:r>
+            <a:endParaRPr lang="en-IN" dirty="0"/>
+          </a:p>
+        </p:txBody>
+      </p:sp>
+      <p:sp>
+        <p:nvSpPr>
+          <p:cNvPr id="8" name="Rectangle 7"/>
+          <p:cNvSpPr/>
+          <p:nvPr/>
+        </p:nvSpPr>
+        <p:spPr>
+          <a:xfrm>
+            <a:off x="3539612" y="2959510"/>
+            <a:ext cx="3323303" cy="501445"/>
+          </a:xfrm>
+          <a:prstGeom prst="rect">
+            <a:avLst/>
+          </a:prstGeom>
+          <a:solidFill>
+            <a:schemeClr val="accent2"/>
+          </a:solidFill>
+        </p:spPr>
+        <p:style>
+          <a:lnRef idx="2">
+            <a:schemeClr val="accent1">
+              <a:shade val="50000"/>
+            </a:schemeClr>
+          </a:lnRef>
+          <a:fillRef idx="1">
+            <a:schemeClr val="accent1"/>
+          </a:fillRef>
+          <a:effectRef idx="0">
+            <a:schemeClr val="accent1"/>
+          </a:effectRef>
+          <a:fontRef idx="minor">
+            <a:schemeClr val="lt1"/>
+          </a:fontRef>
+        </p:style>
+        <p:txBody>
+          <a:bodyPr rtlCol="0" anchor="ctr"/>
+          <a:lstStyle/>
+          <a:p>
+            <a:pPr algn="ctr"/>
+            <a:r>
+              <a:rPr lang="en-US" dirty="0" err="1" smtClean="0"/>
+              <a:t>Todo</a:t>
+            </a:r>
+            <a:r>
+              <a:rPr lang="en-US" dirty="0" smtClean="0"/>
+              <a:t> 2</a:t>
+            </a:r>
+            <a:endParaRPr lang="en-IN" dirty="0"/>
+          </a:p>
+        </p:txBody>
+      </p:sp>
+      <p:sp>
+        <p:nvSpPr>
+          <p:cNvPr id="9" name="Rectangle 8"/>
+          <p:cNvSpPr/>
+          <p:nvPr/>
+        </p:nvSpPr>
+        <p:spPr>
+          <a:xfrm>
+            <a:off x="3546868" y="3593691"/>
+            <a:ext cx="3323303" cy="501445"/>
+          </a:xfrm>
+          <a:prstGeom prst="rect">
+            <a:avLst/>
+          </a:prstGeom>
+          <a:solidFill>
+            <a:schemeClr val="accent2"/>
+          </a:solidFill>
+        </p:spPr>
+        <p:style>
+          <a:lnRef idx="2">
+            <a:schemeClr val="accent1">
+              <a:shade val="50000"/>
+            </a:schemeClr>
+          </a:lnRef>
+          <a:fillRef idx="1">
+            <a:schemeClr val="accent1"/>
+          </a:fillRef>
+          <a:effectRef idx="0">
+            <a:schemeClr val="accent1"/>
+          </a:effectRef>
+          <a:fontRef idx="minor">
+            <a:schemeClr val="lt1"/>
+          </a:fontRef>
+        </p:style>
+        <p:txBody>
+          <a:bodyPr rtlCol="0" anchor="ctr"/>
+          <a:lstStyle/>
+          <a:p>
+            <a:pPr algn="ctr"/>
+            <a:endParaRPr lang="en-IN"/>
+          </a:p>
+        </p:txBody>
+      </p:sp>
+      <p:sp>
+        <p:nvSpPr>
+          <p:cNvPr id="10" name="Rectangle 9"/>
+          <p:cNvSpPr/>
+          <p:nvPr/>
+        </p:nvSpPr>
+        <p:spPr>
+          <a:xfrm>
+            <a:off x="3532357" y="4227872"/>
+            <a:ext cx="3323303" cy="501445"/>
+          </a:xfrm>
+          <a:prstGeom prst="rect">
+            <a:avLst/>
+          </a:prstGeom>
+          <a:solidFill>
+            <a:schemeClr val="accent2"/>
+          </a:solidFill>
+        </p:spPr>
+        <p:style>
+          <a:lnRef idx="2">
+            <a:schemeClr val="accent1">
+              <a:shade val="50000"/>
+            </a:schemeClr>
+          </a:lnRef>
+          <a:fillRef idx="1">
+            <a:schemeClr val="accent1"/>
+          </a:fillRef>
+          <a:effectRef idx="0">
+            <a:schemeClr val="accent1"/>
+          </a:effectRef>
+          <a:fontRef idx="minor">
+            <a:schemeClr val="lt1"/>
+          </a:fontRef>
+        </p:style>
+        <p:txBody>
+          <a:bodyPr rtlCol="0" anchor="ctr"/>
+          <a:lstStyle/>
+          <a:p>
+            <a:pPr algn="ctr"/>
+            <a:endParaRPr lang="en-IN"/>
+          </a:p>
+        </p:txBody>
+      </p:sp>
+      <p:sp>
+        <p:nvSpPr>
+          <p:cNvPr id="11" name="Rectangle 10"/>
+          <p:cNvSpPr/>
+          <p:nvPr/>
+        </p:nvSpPr>
+        <p:spPr>
+          <a:xfrm>
+            <a:off x="3532356" y="4886633"/>
+            <a:ext cx="3323303" cy="501445"/>
+          </a:xfrm>
+          <a:prstGeom prst="rect">
+            <a:avLst/>
+          </a:prstGeom>
+          <a:solidFill>
+            <a:schemeClr val="accent2"/>
+          </a:solidFill>
+        </p:spPr>
+        <p:style>
+          <a:lnRef idx="2">
+            <a:schemeClr val="accent1">
+              <a:shade val="50000"/>
+            </a:schemeClr>
+          </a:lnRef>
+          <a:fillRef idx="1">
+            <a:schemeClr val="accent1"/>
+          </a:fillRef>
+          <a:effectRef idx="0">
+            <a:schemeClr val="accent1"/>
+          </a:effectRef>
+          <a:fontRef idx="minor">
+            <a:schemeClr val="lt1"/>
+          </a:fontRef>
+        </p:style>
+        <p:txBody>
+          <a:bodyPr rtlCol="0" anchor="ctr"/>
+          <a:lstStyle/>
+          <a:p>
+            <a:pPr algn="ctr"/>
+            <a:endParaRPr lang="en-IN"/>
+          </a:p>
+        </p:txBody>
+      </p:sp>
+      <p:sp>
+        <p:nvSpPr>
+          <p:cNvPr id="13" name="Rectangle 12"/>
+          <p:cNvSpPr/>
+          <p:nvPr/>
+        </p:nvSpPr>
+        <p:spPr>
+          <a:xfrm>
+            <a:off x="4523797" y="5471652"/>
+            <a:ext cx="1365438" cy="334297"/>
+          </a:xfrm>
+          <a:prstGeom prst="rect">
+            <a:avLst/>
+          </a:prstGeom>
+          <a:solidFill>
+            <a:srgbClr val="00B050"/>
+          </a:solidFill>
+        </p:spPr>
+        <p:style>
+          <a:lnRef idx="2">
+            <a:schemeClr val="accent1">
+              <a:shade val="50000"/>
+            </a:schemeClr>
+          </a:lnRef>
+          <a:fillRef idx="1">
+            <a:schemeClr val="accent1"/>
+          </a:fillRef>
+          <a:effectRef idx="0">
+            <a:schemeClr val="accent1"/>
+          </a:effectRef>
+          <a:fontRef idx="minor">
+            <a:schemeClr val="lt1"/>
+          </a:fontRef>
+        </p:style>
+        <p:txBody>
+          <a:bodyPr rtlCol="0" anchor="ctr"/>
+          <a:lstStyle/>
+          <a:p>
+            <a:pPr algn="ctr"/>
+            <a:r>
+              <a:rPr lang="en-US" dirty="0" smtClean="0"/>
+              <a:t>Add </a:t>
+            </a:r>
+            <a:r>
+              <a:rPr lang="en-US" dirty="0" err="1" smtClean="0"/>
+              <a:t>todo</a:t>
+            </a:r>
+            <a:endParaRPr lang="en-IN" dirty="0"/>
+          </a:p>
+        </p:txBody>
+      </p:sp>
+      <p:sp>
+        <p:nvSpPr>
+          <p:cNvPr id="14" name="TextBox 13"/>
+          <p:cNvSpPr txBox="1"/>
+          <p:nvPr/>
+        </p:nvSpPr>
+        <p:spPr>
+          <a:xfrm>
+            <a:off x="9322978" y="1720646"/>
+            <a:ext cx="1677319" cy="369332"/>
+          </a:xfrm>
+          <a:prstGeom prst="rect">
+            <a:avLst/>
+          </a:prstGeom>
+          <a:noFill/>
+        </p:spPr>
+        <p:txBody>
+          <a:bodyPr wrap="none" rtlCol="0">
+            <a:spAutoFit/>
+          </a:bodyPr>
+          <a:lstStyle/>
+          <a:p>
+            <a:r>
+              <a:rPr lang="en-US" dirty="0" smtClean="0"/>
+              <a:t>Write your </a:t>
+            </a:r>
+            <a:r>
+              <a:rPr lang="en-US" dirty="0" err="1" smtClean="0"/>
+              <a:t>todo</a:t>
+            </a:r>
+            <a:endParaRPr lang="en-IN" dirty="0"/>
+          </a:p>
+        </p:txBody>
+      </p:sp>
+      <p:sp>
+        <p:nvSpPr>
+          <p:cNvPr id="15" name="Rectangle 14"/>
+          <p:cNvSpPr/>
+          <p:nvPr/>
+        </p:nvSpPr>
+        <p:spPr>
+          <a:xfrm>
+            <a:off x="8652385" y="2172929"/>
+            <a:ext cx="3018504" cy="1927123"/>
+          </a:xfrm>
+          <a:prstGeom prst="rect">
+            <a:avLst/>
+          </a:prstGeom>
+          <a:ln>
+            <a:solidFill>
+              <a:schemeClr val="bg2"/>
+            </a:solidFill>
+          </a:ln>
+        </p:spPr>
+        <p:style>
+          <a:lnRef idx="2">
+            <a:schemeClr val="accent1">
+              <a:shade val="50000"/>
+            </a:schemeClr>
+          </a:lnRef>
+          <a:fillRef idx="1">
+            <a:schemeClr val="accent1"/>
+          </a:fillRef>
+          <a:effectRef idx="0">
+            <a:schemeClr val="accent1"/>
+          </a:effectRef>
+          <a:fontRef idx="minor">
+            <a:schemeClr val="lt1"/>
+          </a:fontRef>
+        </p:style>
+        <p:txBody>
+          <a:bodyPr rtlCol="0" anchor="ctr"/>
+          <a:lstStyle/>
+          <a:p>
+            <a:pPr algn="ctr"/>
+            <a:r>
+              <a:rPr lang="en-US" dirty="0" smtClean="0"/>
+              <a:t>Write your </a:t>
+            </a:r>
+            <a:r>
+              <a:rPr lang="en-US" dirty="0" err="1" smtClean="0"/>
+              <a:t>todo</a:t>
+            </a:r>
+            <a:r>
+              <a:rPr lang="en-US" dirty="0" smtClean="0"/>
+              <a:t> here</a:t>
+            </a:r>
+            <a:endParaRPr lang="en-IN" dirty="0"/>
+          </a:p>
+        </p:txBody>
+      </p:sp>
+      <p:cxnSp>
+        <p:nvCxnSpPr>
+          <p:cNvPr id="17" name="Straight Arrow Connector 16"/>
+          <p:cNvCxnSpPr>
+            <a:stCxn id="13" idx="3"/>
+          </p:cNvCxnSpPr>
+          <p:nvPr/>
+        </p:nvCxnSpPr>
+        <p:spPr>
+          <a:xfrm flipV="1">
+            <a:off x="5889235" y="3460956"/>
+            <a:ext cx="2261707" cy="2177845"/>
+          </a:xfrm>
+          <a:prstGeom prst="straightConnector1">
+            <a:avLst/>
+          </a:prstGeom>
+          <a:ln>
+            <a:tailEnd type="triangle"/>
+          </a:ln>
+        </p:spPr>
+        <p:style>
+          <a:lnRef idx="1">
+            <a:schemeClr val="dk1"/>
+          </a:lnRef>
+          <a:fillRef idx="0">
+            <a:schemeClr val="dk1"/>
+          </a:fillRef>
+          <a:effectRef idx="0">
+            <a:schemeClr val="dk1"/>
+          </a:effectRef>
+          <a:fontRef idx="minor">
+            <a:schemeClr val="tx1"/>
+          </a:fontRef>
+        </p:style>
+      </p:cxnSp>
+      <p:sp>
+        <p:nvSpPr>
+          <p:cNvPr id="19" name="Rectangle 18"/>
+          <p:cNvSpPr/>
+          <p:nvPr/>
+        </p:nvSpPr>
+        <p:spPr>
+          <a:xfrm>
+            <a:off x="9516380" y="4407310"/>
+            <a:ext cx="1384348" cy="587477"/>
+          </a:xfrm>
+          <a:prstGeom prst="rect">
+            <a:avLst/>
+          </a:prstGeom>
+          <a:solidFill>
+            <a:srgbClr val="00B050"/>
+          </a:solidFill>
+        </p:spPr>
+        <p:style>
+          <a:lnRef idx="2">
+            <a:schemeClr val="accent1">
+              <a:shade val="50000"/>
+            </a:schemeClr>
+          </a:lnRef>
+          <a:fillRef idx="1">
+            <a:schemeClr val="accent1"/>
+          </a:fillRef>
+          <a:effectRef idx="0">
+            <a:schemeClr val="accent1"/>
+          </a:effectRef>
+          <a:fontRef idx="minor">
+            <a:schemeClr val="lt1"/>
+          </a:fontRef>
+        </p:style>
+        <p:txBody>
+          <a:bodyPr rtlCol="0" anchor="ctr"/>
+          <a:lstStyle/>
+          <a:p>
+            <a:pPr algn="ctr"/>
+            <a:r>
+              <a:rPr lang="en-US" dirty="0" smtClean="0"/>
+              <a:t>save</a:t>
+            </a:r>
+            <a:endParaRPr lang="en-IN" dirty="0"/>
+          </a:p>
+        </p:txBody>
+      </p:sp>
+      <p:cxnSp>
+        <p:nvCxnSpPr>
+          <p:cNvPr id="21" name="Straight Arrow Connector 20"/>
+          <p:cNvCxnSpPr>
+            <a:stCxn id="19" idx="1"/>
+            <a:endCxn id="4" idx="3"/>
+          </p:cNvCxnSpPr>
+          <p:nvPr/>
+        </p:nvCxnSpPr>
+        <p:spPr>
+          <a:xfrm flipH="1" flipV="1">
+            <a:off x="7143471" y="3765756"/>
+            <a:ext cx="2372909" cy="935293"/>
+          </a:xfrm>
+          <a:prstGeom prst="straightConnector1">
+            <a:avLst/>
+          </a:prstGeom>
+          <a:ln>
+            <a:tailEnd type="triangle"/>
+          </a:ln>
+        </p:spPr>
+        <p:style>
+          <a:lnRef idx="1">
+            <a:schemeClr val="dk1"/>
+          </a:lnRef>
+          <a:fillRef idx="0">
+            <a:schemeClr val="dk1"/>
+          </a:fillRef>
+          <a:effectRef idx="0">
+            <a:schemeClr val="dk1"/>
+          </a:effectRef>
+          <a:fontRef idx="minor">
+            <a:schemeClr val="tx1"/>
+          </a:fontRef>
+        </p:style>
+      </p:cxnSp>
+      <p:sp>
+        <p:nvSpPr>
+          <p:cNvPr id="22" name="Rectangle 21"/>
+          <p:cNvSpPr/>
+          <p:nvPr/>
+        </p:nvSpPr>
+        <p:spPr>
+          <a:xfrm>
+            <a:off x="344129" y="2477729"/>
+            <a:ext cx="2467897" cy="2993923"/>
+          </a:xfrm>
+          <a:prstGeom prst="rect">
+            <a:avLst/>
+          </a:prstGeom>
+        </p:spPr>
+        <p:style>
+          <a:lnRef idx="2">
+            <a:schemeClr val="accent1">
+              <a:shade val="50000"/>
+            </a:schemeClr>
+          </a:lnRef>
+          <a:fillRef idx="1">
+            <a:schemeClr val="accent1"/>
+          </a:fillRef>
+          <a:effectRef idx="0">
+            <a:schemeClr val="accent1"/>
+          </a:effectRef>
+          <a:fontRef idx="minor">
+            <a:schemeClr val="lt1"/>
+          </a:fontRef>
+        </p:style>
+        <p:txBody>
+          <a:bodyPr rtlCol="0" anchor="ctr"/>
+          <a:lstStyle/>
+          <a:p>
+            <a:pPr algn="ctr"/>
+            <a:r>
+              <a:rPr lang="en-US" dirty="0" smtClean="0"/>
+              <a:t>Login/Register</a:t>
+            </a:r>
+            <a:endParaRPr lang="en-IN" dirty="0"/>
+          </a:p>
+        </p:txBody>
+      </p:sp>
+      <p:sp>
+        <p:nvSpPr>
+          <p:cNvPr id="23" name="Rectangle 22"/>
+          <p:cNvSpPr/>
+          <p:nvPr/>
+        </p:nvSpPr>
+        <p:spPr>
+          <a:xfrm>
+            <a:off x="6253316" y="2392008"/>
+            <a:ext cx="452284" cy="331529"/>
+          </a:xfrm>
+          <a:prstGeom prst="rect">
+            <a:avLst/>
+          </a:prstGeom>
+          <a:solidFill>
+            <a:srgbClr val="FF0000"/>
+          </a:solidFill>
+        </p:spPr>
+        <p:style>
+          <a:lnRef idx="2">
+            <a:schemeClr val="accent1">
+              <a:shade val="50000"/>
+            </a:schemeClr>
+          </a:lnRef>
+          <a:fillRef idx="1">
+            <a:schemeClr val="accent1"/>
+          </a:fillRef>
+          <a:effectRef idx="0">
+            <a:schemeClr val="accent1"/>
+          </a:effectRef>
+          <a:fontRef idx="minor">
+            <a:schemeClr val="lt1"/>
+          </a:fontRef>
+        </p:style>
+        <p:txBody>
+          <a:bodyPr rtlCol="0" anchor="ctr"/>
+          <a:lstStyle/>
+          <a:p>
+            <a:pPr algn="ctr"/>
+            <a:endParaRPr lang="en-IN">
+              <a:solidFill>
+                <a:srgbClr val="FF0000"/>
+              </a:solidFill>
+            </a:endParaRPr>
+          </a:p>
+        </p:txBody>
+      </p:sp>
+      <p:sp>
+        <p:nvSpPr>
+          <p:cNvPr id="24" name="Rectangle 23"/>
+          <p:cNvSpPr/>
+          <p:nvPr/>
+        </p:nvSpPr>
+        <p:spPr>
+          <a:xfrm>
+            <a:off x="6253316" y="3046163"/>
+            <a:ext cx="452284" cy="331529"/>
+          </a:xfrm>
+          <a:prstGeom prst="rect">
+            <a:avLst/>
+          </a:prstGeom>
+          <a:solidFill>
+            <a:srgbClr val="FF0000"/>
+          </a:solidFill>
+        </p:spPr>
+        <p:style>
+          <a:lnRef idx="2">
+            <a:schemeClr val="accent1">
+              <a:shade val="50000"/>
+            </a:schemeClr>
+          </a:lnRef>
+          <a:fillRef idx="1">
+            <a:schemeClr val="accent1"/>
+          </a:fillRef>
+          <a:effectRef idx="0">
+            <a:schemeClr val="accent1"/>
+          </a:effectRef>
+          <a:fontRef idx="minor">
+            <a:schemeClr val="lt1"/>
+          </a:fontRef>
+        </p:style>
+        <p:txBody>
+          <a:bodyPr rtlCol="0" anchor="ctr"/>
+          <a:lstStyle/>
+          <a:p>
+            <a:pPr algn="ctr"/>
+            <a:endParaRPr lang="en-IN">
+              <a:solidFill>
+                <a:srgbClr val="FF0000"/>
+              </a:solidFill>
+            </a:endParaRPr>
+          </a:p>
+        </p:txBody>
+      </p:sp>
+      <p:sp>
+        <p:nvSpPr>
+          <p:cNvPr id="25" name="Rectangle 24"/>
+          <p:cNvSpPr/>
+          <p:nvPr/>
+        </p:nvSpPr>
+        <p:spPr>
+          <a:xfrm>
+            <a:off x="6316224" y="3704925"/>
+            <a:ext cx="452284" cy="331529"/>
+          </a:xfrm>
+          <a:prstGeom prst="rect">
+            <a:avLst/>
+          </a:prstGeom>
+          <a:solidFill>
+            <a:srgbClr val="FF0000"/>
+          </a:solidFill>
+        </p:spPr>
+        <p:style>
+          <a:lnRef idx="2">
+            <a:schemeClr val="accent1">
+              <a:shade val="50000"/>
+            </a:schemeClr>
+          </a:lnRef>
+          <a:fillRef idx="1">
+            <a:schemeClr val="accent1"/>
+          </a:fillRef>
+          <a:effectRef idx="0">
+            <a:schemeClr val="accent1"/>
+          </a:effectRef>
+          <a:fontRef idx="minor">
+            <a:schemeClr val="lt1"/>
+          </a:fontRef>
+        </p:style>
+        <p:txBody>
+          <a:bodyPr rtlCol="0" anchor="ctr"/>
+          <a:lstStyle/>
+          <a:p>
+            <a:pPr algn="ctr"/>
+            <a:endParaRPr lang="en-IN">
+              <a:solidFill>
+                <a:srgbClr val="FF0000"/>
+              </a:solidFill>
+            </a:endParaRPr>
+          </a:p>
+        </p:txBody>
+      </p:sp>
+      <p:sp>
+        <p:nvSpPr>
+          <p:cNvPr id="26" name="Rectangle 25"/>
+          <p:cNvSpPr/>
+          <p:nvPr/>
+        </p:nvSpPr>
+        <p:spPr>
+          <a:xfrm>
+            <a:off x="6328395" y="4321590"/>
+            <a:ext cx="452284" cy="331529"/>
+          </a:xfrm>
+          <a:prstGeom prst="rect">
+            <a:avLst/>
+          </a:prstGeom>
+          <a:solidFill>
+            <a:srgbClr val="FF0000"/>
+          </a:solidFill>
+        </p:spPr>
+        <p:style>
+          <a:lnRef idx="2">
+            <a:schemeClr val="accent1">
+              <a:shade val="50000"/>
+            </a:schemeClr>
+          </a:lnRef>
+          <a:fillRef idx="1">
+            <a:schemeClr val="accent1"/>
+          </a:fillRef>
+          <a:effectRef idx="0">
+            <a:schemeClr val="accent1"/>
+          </a:effectRef>
+          <a:fontRef idx="minor">
+            <a:schemeClr val="lt1"/>
+          </a:fontRef>
+        </p:style>
+        <p:txBody>
+          <a:bodyPr rtlCol="0" anchor="ctr"/>
+          <a:lstStyle/>
+          <a:p>
+            <a:pPr algn="ctr"/>
+            <a:endParaRPr lang="en-IN">
+              <a:solidFill>
+                <a:srgbClr val="FF0000"/>
+              </a:solidFill>
+            </a:endParaRPr>
+          </a:p>
+        </p:txBody>
+      </p:sp>
+      <p:sp>
+        <p:nvSpPr>
+          <p:cNvPr id="27" name="Rectangle 26"/>
+          <p:cNvSpPr/>
+          <p:nvPr/>
+        </p:nvSpPr>
+        <p:spPr>
+          <a:xfrm>
+            <a:off x="6316224" y="4994787"/>
+            <a:ext cx="452284" cy="331529"/>
+          </a:xfrm>
+          <a:prstGeom prst="rect">
+            <a:avLst/>
+          </a:prstGeom>
+          <a:solidFill>
+            <a:srgbClr val="FF0000"/>
+          </a:solidFill>
+        </p:spPr>
+        <p:style>
+          <a:lnRef idx="2">
+            <a:schemeClr val="accent1">
+              <a:shade val="50000"/>
+            </a:schemeClr>
+          </a:lnRef>
+          <a:fillRef idx="1">
+            <a:schemeClr val="accent1"/>
+          </a:fillRef>
+          <a:effectRef idx="0">
+            <a:schemeClr val="accent1"/>
+          </a:effectRef>
+          <a:fontRef idx="minor">
+            <a:schemeClr val="lt1"/>
+          </a:fontRef>
+        </p:style>
+        <p:txBody>
+          <a:bodyPr rtlCol="0" anchor="ctr"/>
+          <a:lstStyle/>
+          <a:p>
+            <a:pPr algn="ctr"/>
+            <a:endParaRPr lang="en-IN">
+              <a:solidFill>
+                <a:srgbClr val="FF0000"/>
+              </a:solidFill>
+            </a:endParaRPr>
+          </a:p>
+        </p:txBody>
+      </p:sp>
+      <p:sp>
+        <p:nvSpPr>
+          <p:cNvPr id="28" name="TextBox 27"/>
+          <p:cNvSpPr txBox="1"/>
+          <p:nvPr/>
+        </p:nvSpPr>
+        <p:spPr>
+          <a:xfrm>
+            <a:off x="4392617" y="5992884"/>
+            <a:ext cx="3247364" cy="584775"/>
+          </a:xfrm>
+          <a:prstGeom prst="rect">
+            <a:avLst/>
+          </a:prstGeom>
+          <a:noFill/>
+        </p:spPr>
+        <p:txBody>
+          <a:bodyPr wrap="none" rtlCol="0">
+            <a:spAutoFit/>
+          </a:bodyPr>
+          <a:lstStyle/>
+          <a:p>
+            <a:r>
+              <a:rPr lang="en-US" sz="3200" b="1" dirty="0" smtClean="0"/>
+              <a:t>Wireframe Design</a:t>
+            </a:r>
+            <a:endParaRPr lang="en-IN" sz="3200" b="1" dirty="0"/>
+          </a:p>
+        </p:txBody>
+      </p:sp>
+    </p:spTree>
+    <p:extLst>
+      <p:ext uri="{BB962C8B-B14F-4D97-AF65-F5344CB8AC3E}">
+        <p14:creationId xmlns:p14="http://schemas.microsoft.com/office/powerpoint/2010/main" val="1443643924"/>
+      </p:ext>
+    </p:extLst>
+  </p:cSld>
+  <p:clrMapOvr>
+    <a:masterClrMapping/>
+  </p:clrMapOvr>
+</p:sld>
+</file>
+
 <file path=ppt/slides/slide2.xml><?xml version="1.0" encoding="utf-8"?>
 <p:sld xmlns:a="http://schemas.openxmlformats.org/drawingml/2006/main" xmlns:r="http://schemas.openxmlformats.org/officeDocument/2006/relationships" xmlns:p="http://schemas.openxmlformats.org/presentationml/2006/main">
   <p:cSld>
@@ -7009,6 +8571,137 @@
             <a:r>
               <a:rPr lang="en-US" dirty="0" smtClean="0"/>
               <a:t>data</a:t>
+            </a:r>
+            <a:endParaRPr lang="en-IN" dirty="0"/>
+          </a:p>
+        </p:txBody>
+      </p:sp>
+      <p:sp>
+        <p:nvSpPr>
+          <p:cNvPr id="18" name="TextBox 17"/>
+          <p:cNvSpPr txBox="1"/>
+          <p:nvPr/>
+        </p:nvSpPr>
+        <p:spPr>
+          <a:xfrm>
+            <a:off x="806002" y="4420051"/>
+            <a:ext cx="1909112" cy="369332"/>
+          </a:xfrm>
+          <a:prstGeom prst="rect">
+            <a:avLst/>
+          </a:prstGeom>
+          <a:noFill/>
+        </p:spPr>
+        <p:txBody>
+          <a:bodyPr wrap="none" rtlCol="0">
+            <a:spAutoFit/>
+          </a:bodyPr>
+          <a:lstStyle/>
+          <a:p>
+            <a:r>
+              <a:rPr lang="en-US" dirty="0" err="1" smtClean="0"/>
+              <a:t>url?variable</a:t>
+            </a:r>
+            <a:r>
+              <a:rPr lang="en-US" dirty="0" smtClean="0"/>
+              <a:t>=value</a:t>
+            </a:r>
+            <a:endParaRPr lang="en-IN" dirty="0"/>
+          </a:p>
+        </p:txBody>
+      </p:sp>
+      <p:cxnSp>
+        <p:nvCxnSpPr>
+          <p:cNvPr id="19" name="Straight Connector 18"/>
+          <p:cNvCxnSpPr/>
+          <p:nvPr/>
+        </p:nvCxnSpPr>
+        <p:spPr>
+          <a:xfrm>
+            <a:off x="1169795" y="4789383"/>
+            <a:ext cx="1511711" cy="0"/>
+          </a:xfrm>
+          <a:prstGeom prst="line">
+            <a:avLst/>
+          </a:prstGeom>
+        </p:spPr>
+        <p:style>
+          <a:lnRef idx="1">
+            <a:schemeClr val="accent1"/>
+          </a:lnRef>
+          <a:fillRef idx="0">
+            <a:schemeClr val="accent1"/>
+          </a:fillRef>
+          <a:effectRef idx="0">
+            <a:schemeClr val="accent1"/>
+          </a:effectRef>
+          <a:fontRef idx="minor">
+            <a:schemeClr val="tx1"/>
+          </a:fontRef>
+        </p:style>
+      </p:cxnSp>
+      <p:cxnSp>
+        <p:nvCxnSpPr>
+          <p:cNvPr id="20" name="Straight Arrow Connector 19"/>
+          <p:cNvCxnSpPr/>
+          <p:nvPr/>
+        </p:nvCxnSpPr>
+        <p:spPr>
+          <a:xfrm>
+            <a:off x="2113692" y="4872334"/>
+            <a:ext cx="1474839" cy="757084"/>
+          </a:xfrm>
+          <a:prstGeom prst="straightConnector1">
+            <a:avLst/>
+          </a:prstGeom>
+          <a:ln>
+            <a:tailEnd type="triangle"/>
+          </a:ln>
+        </p:spPr>
+        <p:style>
+          <a:lnRef idx="1">
+            <a:schemeClr val="accent1"/>
+          </a:lnRef>
+          <a:fillRef idx="0">
+            <a:schemeClr val="accent1"/>
+          </a:fillRef>
+          <a:effectRef idx="0">
+            <a:schemeClr val="accent1"/>
+          </a:effectRef>
+          <a:fontRef idx="minor">
+            <a:schemeClr val="tx1"/>
+          </a:fontRef>
+        </p:style>
+      </p:cxnSp>
+      <p:sp>
+        <p:nvSpPr>
+          <p:cNvPr id="21" name="TextBox 20"/>
+          <p:cNvSpPr txBox="1"/>
+          <p:nvPr/>
+        </p:nvSpPr>
+        <p:spPr>
+          <a:xfrm>
+            <a:off x="3224242" y="5629418"/>
+            <a:ext cx="2076915" cy="369332"/>
+          </a:xfrm>
+          <a:prstGeom prst="rect">
+            <a:avLst/>
+          </a:prstGeom>
+          <a:noFill/>
+        </p:spPr>
+        <p:txBody>
+          <a:bodyPr wrap="none" rtlCol="0">
+            <a:spAutoFit/>
+          </a:bodyPr>
+          <a:lstStyle/>
+          <a:p>
+            <a:r>
+              <a:rPr lang="en-US" dirty="0" err="1" smtClean="0"/>
+              <a:t>url</a:t>
+            </a:r>
+            <a:r>
+              <a:rPr lang="en-US" dirty="0" smtClean="0"/>
+              <a:t> query parameter</a:t>
             </a:r>
             <a:endParaRPr lang="en-IN" dirty="0"/>
           </a:p>

</xml_diff>

<commit_message>
Implement Todo application with CRUD functionality, including user authentication, todo management, and database integration. Updated JSP forms and added necessary servlets for handling requests.
</commit_message>
<xml_diff>
--- a/Servlet.pptx
+++ b/Servlet.pptx
@@ -18,6 +18,7 @@
     <p:sldId id="266" r:id="rId12"/>
     <p:sldId id="267" r:id="rId13"/>
     <p:sldId id="268" r:id="rId14"/>
+    <p:sldId id="269" r:id="rId15"/>
   </p:sldIdLst>
   <p:sldSz cx="12192000" cy="6858000"/>
   <p:notesSz cx="6858000" cy="9144000"/>
@@ -255,7 +256,7 @@
           <a:p>
             <a:fld id="{08F07EE7-8551-46C8-8A9C-D13C266C12F4}" type="datetimeFigureOut">
               <a:rPr lang="en-IN" smtClean="0"/>
-              <a:t>05-05-2025</a:t>
+              <a:t>10-05-2025</a:t>
             </a:fld>
             <a:endParaRPr lang="en-IN"/>
           </a:p>
@@ -425,7 +426,7 @@
           <a:p>
             <a:fld id="{08F07EE7-8551-46C8-8A9C-D13C266C12F4}" type="datetimeFigureOut">
               <a:rPr lang="en-IN" smtClean="0"/>
-              <a:t>05-05-2025</a:t>
+              <a:t>10-05-2025</a:t>
             </a:fld>
             <a:endParaRPr lang="en-IN"/>
           </a:p>
@@ -605,7 +606,7 @@
           <a:p>
             <a:fld id="{08F07EE7-8551-46C8-8A9C-D13C266C12F4}" type="datetimeFigureOut">
               <a:rPr lang="en-IN" smtClean="0"/>
-              <a:t>05-05-2025</a:t>
+              <a:t>10-05-2025</a:t>
             </a:fld>
             <a:endParaRPr lang="en-IN"/>
           </a:p>
@@ -775,7 +776,7 @@
           <a:p>
             <a:fld id="{08F07EE7-8551-46C8-8A9C-D13C266C12F4}" type="datetimeFigureOut">
               <a:rPr lang="en-IN" smtClean="0"/>
-              <a:t>05-05-2025</a:t>
+              <a:t>10-05-2025</a:t>
             </a:fld>
             <a:endParaRPr lang="en-IN"/>
           </a:p>
@@ -1021,7 +1022,7 @@
           <a:p>
             <a:fld id="{08F07EE7-8551-46C8-8A9C-D13C266C12F4}" type="datetimeFigureOut">
               <a:rPr lang="en-IN" smtClean="0"/>
-              <a:t>05-05-2025</a:t>
+              <a:t>10-05-2025</a:t>
             </a:fld>
             <a:endParaRPr lang="en-IN"/>
           </a:p>
@@ -1253,7 +1254,7 @@
           <a:p>
             <a:fld id="{08F07EE7-8551-46C8-8A9C-D13C266C12F4}" type="datetimeFigureOut">
               <a:rPr lang="en-IN" smtClean="0"/>
-              <a:t>05-05-2025</a:t>
+              <a:t>10-05-2025</a:t>
             </a:fld>
             <a:endParaRPr lang="en-IN"/>
           </a:p>
@@ -1620,7 +1621,7 @@
           <a:p>
             <a:fld id="{08F07EE7-8551-46C8-8A9C-D13C266C12F4}" type="datetimeFigureOut">
               <a:rPr lang="en-IN" smtClean="0"/>
-              <a:t>05-05-2025</a:t>
+              <a:t>10-05-2025</a:t>
             </a:fld>
             <a:endParaRPr lang="en-IN"/>
           </a:p>
@@ -1738,7 +1739,7 @@
           <a:p>
             <a:fld id="{08F07EE7-8551-46C8-8A9C-D13C266C12F4}" type="datetimeFigureOut">
               <a:rPr lang="en-IN" smtClean="0"/>
-              <a:t>05-05-2025</a:t>
+              <a:t>10-05-2025</a:t>
             </a:fld>
             <a:endParaRPr lang="en-IN"/>
           </a:p>
@@ -1833,7 +1834,7 @@
           <a:p>
             <a:fld id="{08F07EE7-8551-46C8-8A9C-D13C266C12F4}" type="datetimeFigureOut">
               <a:rPr lang="en-IN" smtClean="0"/>
-              <a:t>05-05-2025</a:t>
+              <a:t>10-05-2025</a:t>
             </a:fld>
             <a:endParaRPr lang="en-IN"/>
           </a:p>
@@ -2110,7 +2111,7 @@
           <a:p>
             <a:fld id="{08F07EE7-8551-46C8-8A9C-D13C266C12F4}" type="datetimeFigureOut">
               <a:rPr lang="en-IN" smtClean="0"/>
-              <a:t>05-05-2025</a:t>
+              <a:t>10-05-2025</a:t>
             </a:fld>
             <a:endParaRPr lang="en-IN"/>
           </a:p>
@@ -2363,7 +2364,7 @@
           <a:p>
             <a:fld id="{08F07EE7-8551-46C8-8A9C-D13C266C12F4}" type="datetimeFigureOut">
               <a:rPr lang="en-IN" smtClean="0"/>
-              <a:t>05-05-2025</a:t>
+              <a:t>10-05-2025</a:t>
             </a:fld>
             <a:endParaRPr lang="en-IN"/>
           </a:p>
@@ -2576,7 +2577,7 @@
           <a:p>
             <a:fld id="{08F07EE7-8551-46C8-8A9C-D13C266C12F4}" type="datetimeFigureOut">
               <a:rPr lang="en-IN" smtClean="0"/>
-              <a:t>05-05-2025</a:t>
+              <a:t>10-05-2025</a:t>
             </a:fld>
             <a:endParaRPr lang="en-IN"/>
           </a:p>
@@ -5758,6 +5759,79 @@
 </p:sld>
 </file>
 
+<file path=ppt/slides/slide14.xml><?xml version="1.0" encoding="utf-8"?>
+<p:sld xmlns:a="http://schemas.openxmlformats.org/drawingml/2006/main" xmlns:r="http://schemas.openxmlformats.org/officeDocument/2006/relationships" xmlns:p="http://schemas.openxmlformats.org/presentationml/2006/main">
+  <p:cSld>
+    <p:spTree>
+      <p:nvGrpSpPr>
+        <p:cNvPr id="1" name=""/>
+        <p:cNvGrpSpPr/>
+        <p:nvPr/>
+      </p:nvGrpSpPr>
+      <p:grpSpPr>
+        <a:xfrm>
+          <a:off x="0" y="0"/>
+          <a:ext cx="0" cy="0"/>
+          <a:chOff x="0" y="0"/>
+          <a:chExt cx="0" cy="0"/>
+        </a:xfrm>
+      </p:grpSpPr>
+      <p:sp>
+        <p:nvSpPr>
+          <p:cNvPr id="2" name="TextBox 1"/>
+          <p:cNvSpPr txBox="1"/>
+          <p:nvPr/>
+        </p:nvSpPr>
+        <p:spPr>
+          <a:xfrm>
+            <a:off x="3274142" y="1524000"/>
+            <a:ext cx="1562094" cy="923330"/>
+          </a:xfrm>
+          <a:prstGeom prst="rect">
+            <a:avLst/>
+          </a:prstGeom>
+          <a:noFill/>
+        </p:spPr>
+        <p:txBody>
+          <a:bodyPr wrap="none" rtlCol="0">
+            <a:spAutoFit/>
+          </a:bodyPr>
+          <a:lstStyle/>
+          <a:p>
+            <a:r>
+              <a:rPr lang="en-US" dirty="0" err="1" smtClean="0"/>
+              <a:t>Sci</a:t>
+            </a:r>
+            <a:r>
+              <a:rPr lang="en-US" dirty="0" smtClean="0"/>
+              <a:t> - Calculator</a:t>
+            </a:r>
+          </a:p>
+          <a:p>
+            <a:endParaRPr lang="en-US" dirty="0"/>
+          </a:p>
+          <a:p>
+            <a:r>
+              <a:rPr lang="en-US" dirty="0" smtClean="0"/>
+              <a:t>History save</a:t>
+            </a:r>
+            <a:endParaRPr lang="en-IN" dirty="0"/>
+          </a:p>
+        </p:txBody>
+      </p:sp>
+    </p:spTree>
+    <p:extLst>
+      <p:ext uri="{BB962C8B-B14F-4D97-AF65-F5344CB8AC3E}">
+        <p14:creationId xmlns:p14="http://schemas.microsoft.com/office/powerpoint/2010/main" val="3577263029"/>
+      </p:ext>
+    </p:extLst>
+  </p:cSld>
+  <p:clrMapOvr>
+    <a:masterClrMapping/>
+  </p:clrMapOvr>
+</p:sld>
+</file>
+
 <file path=ppt/slides/slide2.xml><?xml version="1.0" encoding="utf-8"?>
 <p:sld xmlns:a="http://schemas.openxmlformats.org/drawingml/2006/main" xmlns:r="http://schemas.openxmlformats.org/officeDocument/2006/relationships" xmlns:p="http://schemas.openxmlformats.org/presentationml/2006/main">
   <p:cSld>

</xml_diff>

<commit_message>
Refactor TodoApplication to Calculator application, updating servlets, JSP pages, and configuration files. Added MainServlet for expression evaluation and implemented session management with a logout feature.
</commit_message>
<xml_diff>
--- a/Servlet.pptx
+++ b/Servlet.pptx
@@ -256,7 +256,7 @@
           <a:p>
             <a:fld id="{08F07EE7-8551-46C8-8A9C-D13C266C12F4}" type="datetimeFigureOut">
               <a:rPr lang="en-IN" smtClean="0"/>
-              <a:t>10-05-2025</a:t>
+              <a:t>11-05-2025</a:t>
             </a:fld>
             <a:endParaRPr lang="en-IN"/>
           </a:p>
@@ -426,7 +426,7 @@
           <a:p>
             <a:fld id="{08F07EE7-8551-46C8-8A9C-D13C266C12F4}" type="datetimeFigureOut">
               <a:rPr lang="en-IN" smtClean="0"/>
-              <a:t>10-05-2025</a:t>
+              <a:t>11-05-2025</a:t>
             </a:fld>
             <a:endParaRPr lang="en-IN"/>
           </a:p>
@@ -606,7 +606,7 @@
           <a:p>
             <a:fld id="{08F07EE7-8551-46C8-8A9C-D13C266C12F4}" type="datetimeFigureOut">
               <a:rPr lang="en-IN" smtClean="0"/>
-              <a:t>10-05-2025</a:t>
+              <a:t>11-05-2025</a:t>
             </a:fld>
             <a:endParaRPr lang="en-IN"/>
           </a:p>
@@ -776,7 +776,7 @@
           <a:p>
             <a:fld id="{08F07EE7-8551-46C8-8A9C-D13C266C12F4}" type="datetimeFigureOut">
               <a:rPr lang="en-IN" smtClean="0"/>
-              <a:t>10-05-2025</a:t>
+              <a:t>11-05-2025</a:t>
             </a:fld>
             <a:endParaRPr lang="en-IN"/>
           </a:p>
@@ -1022,7 +1022,7 @@
           <a:p>
             <a:fld id="{08F07EE7-8551-46C8-8A9C-D13C266C12F4}" type="datetimeFigureOut">
               <a:rPr lang="en-IN" smtClean="0"/>
-              <a:t>10-05-2025</a:t>
+              <a:t>11-05-2025</a:t>
             </a:fld>
             <a:endParaRPr lang="en-IN"/>
           </a:p>
@@ -1254,7 +1254,7 @@
           <a:p>
             <a:fld id="{08F07EE7-8551-46C8-8A9C-D13C266C12F4}" type="datetimeFigureOut">
               <a:rPr lang="en-IN" smtClean="0"/>
-              <a:t>10-05-2025</a:t>
+              <a:t>11-05-2025</a:t>
             </a:fld>
             <a:endParaRPr lang="en-IN"/>
           </a:p>
@@ -1621,7 +1621,7 @@
           <a:p>
             <a:fld id="{08F07EE7-8551-46C8-8A9C-D13C266C12F4}" type="datetimeFigureOut">
               <a:rPr lang="en-IN" smtClean="0"/>
-              <a:t>10-05-2025</a:t>
+              <a:t>11-05-2025</a:t>
             </a:fld>
             <a:endParaRPr lang="en-IN"/>
           </a:p>
@@ -1739,7 +1739,7 @@
           <a:p>
             <a:fld id="{08F07EE7-8551-46C8-8A9C-D13C266C12F4}" type="datetimeFigureOut">
               <a:rPr lang="en-IN" smtClean="0"/>
-              <a:t>10-05-2025</a:t>
+              <a:t>11-05-2025</a:t>
             </a:fld>
             <a:endParaRPr lang="en-IN"/>
           </a:p>
@@ -1834,7 +1834,7 @@
           <a:p>
             <a:fld id="{08F07EE7-8551-46C8-8A9C-D13C266C12F4}" type="datetimeFigureOut">
               <a:rPr lang="en-IN" smtClean="0"/>
-              <a:t>10-05-2025</a:t>
+              <a:t>11-05-2025</a:t>
             </a:fld>
             <a:endParaRPr lang="en-IN"/>
           </a:p>
@@ -2111,7 +2111,7 @@
           <a:p>
             <a:fld id="{08F07EE7-8551-46C8-8A9C-D13C266C12F4}" type="datetimeFigureOut">
               <a:rPr lang="en-IN" smtClean="0"/>
-              <a:t>10-05-2025</a:t>
+              <a:t>11-05-2025</a:t>
             </a:fld>
             <a:endParaRPr lang="en-IN"/>
           </a:p>
@@ -2364,7 +2364,7 @@
           <a:p>
             <a:fld id="{08F07EE7-8551-46C8-8A9C-D13C266C12F4}" type="datetimeFigureOut">
               <a:rPr lang="en-IN" smtClean="0"/>
-              <a:t>10-05-2025</a:t>
+              <a:t>11-05-2025</a:t>
             </a:fld>
             <a:endParaRPr lang="en-IN"/>
           </a:p>
@@ -2577,7 +2577,7 @@
           <a:p>
             <a:fld id="{08F07EE7-8551-46C8-8A9C-D13C266C12F4}" type="datetimeFigureOut">
               <a:rPr lang="en-IN" smtClean="0"/>
-              <a:t>10-05-2025</a:t>
+              <a:t>11-05-2025</a:t>
             </a:fld>
             <a:endParaRPr lang="en-IN"/>
           </a:p>
@@ -5784,7 +5784,7 @@
         </p:nvSpPr>
         <p:spPr>
           <a:xfrm>
-            <a:off x="3274142" y="1524000"/>
+            <a:off x="3234813" y="1484671"/>
             <a:ext cx="1562094" cy="923330"/>
           </a:xfrm>
           <a:prstGeom prst="rect">

</xml_diff>